<commit_message>
add trigger socket listener within the graph
</commit_message>
<xml_diff>
--- a/docs/diagrams.pptx
+++ b/docs/diagrams.pptx
@@ -194,7 +194,7 @@
           <a:p>
             <a:fld id="{271CB022-C729-AD44-9E63-C9D1628CEFEF}" type="datetimeFigureOut">
               <a:rPr lang="en-US" smtClean="0"/>
-              <a:t>8/04/15</a:t>
+              <a:t>18/08/15</a:t>
             </a:fld>
             <a:endParaRPr lang="en-US"/>
           </a:p>
@@ -1135,7 +1135,7 @@
           <a:p>
             <a:fld id="{1C5C21A4-DACA-EE40-B4F5-4EEEF25A4F1E}" type="datetimeFigureOut">
               <a:rPr lang="en-US" smtClean="0"/>
-              <a:t>8/04/15</a:t>
+              <a:t>18/08/15</a:t>
             </a:fld>
             <a:endParaRPr lang="en-US"/>
           </a:p>
@@ -1305,7 +1305,7 @@
           <a:p>
             <a:fld id="{1C5C21A4-DACA-EE40-B4F5-4EEEF25A4F1E}" type="datetimeFigureOut">
               <a:rPr lang="en-US" smtClean="0"/>
-              <a:t>8/04/15</a:t>
+              <a:t>18/08/15</a:t>
             </a:fld>
             <a:endParaRPr lang="en-US"/>
           </a:p>
@@ -1485,7 +1485,7 @@
           <a:p>
             <a:fld id="{1C5C21A4-DACA-EE40-B4F5-4EEEF25A4F1E}" type="datetimeFigureOut">
               <a:rPr lang="en-US" smtClean="0"/>
-              <a:t>8/04/15</a:t>
+              <a:t>18/08/15</a:t>
             </a:fld>
             <a:endParaRPr lang="en-US"/>
           </a:p>
@@ -1655,7 +1655,7 @@
           <a:p>
             <a:fld id="{1C5C21A4-DACA-EE40-B4F5-4EEEF25A4F1E}" type="datetimeFigureOut">
               <a:rPr lang="en-US" smtClean="0"/>
-              <a:t>8/04/15</a:t>
+              <a:t>18/08/15</a:t>
             </a:fld>
             <a:endParaRPr lang="en-US"/>
           </a:p>
@@ -1901,7 +1901,7 @@
           <a:p>
             <a:fld id="{1C5C21A4-DACA-EE40-B4F5-4EEEF25A4F1E}" type="datetimeFigureOut">
               <a:rPr lang="en-US" smtClean="0"/>
-              <a:t>8/04/15</a:t>
+              <a:t>18/08/15</a:t>
             </a:fld>
             <a:endParaRPr lang="en-US"/>
           </a:p>
@@ -2189,7 +2189,7 @@
           <a:p>
             <a:fld id="{1C5C21A4-DACA-EE40-B4F5-4EEEF25A4F1E}" type="datetimeFigureOut">
               <a:rPr lang="en-US" smtClean="0"/>
-              <a:t>8/04/15</a:t>
+              <a:t>18/08/15</a:t>
             </a:fld>
             <a:endParaRPr lang="en-US"/>
           </a:p>
@@ -2611,7 +2611,7 @@
           <a:p>
             <a:fld id="{1C5C21A4-DACA-EE40-B4F5-4EEEF25A4F1E}" type="datetimeFigureOut">
               <a:rPr lang="en-US" smtClean="0"/>
-              <a:t>8/04/15</a:t>
+              <a:t>18/08/15</a:t>
             </a:fld>
             <a:endParaRPr lang="en-US"/>
           </a:p>
@@ -2729,7 +2729,7 @@
           <a:p>
             <a:fld id="{1C5C21A4-DACA-EE40-B4F5-4EEEF25A4F1E}" type="datetimeFigureOut">
               <a:rPr lang="en-US" smtClean="0"/>
-              <a:t>8/04/15</a:t>
+              <a:t>18/08/15</a:t>
             </a:fld>
             <a:endParaRPr lang="en-US"/>
           </a:p>
@@ -2824,7 +2824,7 @@
           <a:p>
             <a:fld id="{1C5C21A4-DACA-EE40-B4F5-4EEEF25A4F1E}" type="datetimeFigureOut">
               <a:rPr lang="en-US" smtClean="0"/>
-              <a:t>8/04/15</a:t>
+              <a:t>18/08/15</a:t>
             </a:fld>
             <a:endParaRPr lang="en-US"/>
           </a:p>
@@ -3101,7 +3101,7 @@
           <a:p>
             <a:fld id="{1C5C21A4-DACA-EE40-B4F5-4EEEF25A4F1E}" type="datetimeFigureOut">
               <a:rPr lang="en-US" smtClean="0"/>
-              <a:t>8/04/15</a:t>
+              <a:t>18/08/15</a:t>
             </a:fld>
             <a:endParaRPr lang="en-US"/>
           </a:p>
@@ -3354,7 +3354,7 @@
           <a:p>
             <a:fld id="{1C5C21A4-DACA-EE40-B4F5-4EEEF25A4F1E}" type="datetimeFigureOut">
               <a:rPr lang="en-US" smtClean="0"/>
-              <a:t>8/04/15</a:t>
+              <a:t>18/08/15</a:t>
             </a:fld>
             <a:endParaRPr lang="en-US"/>
           </a:p>
@@ -3567,7 +3567,7 @@
           <a:p>
             <a:fld id="{1C5C21A4-DACA-EE40-B4F5-4EEEF25A4F1E}" type="datetimeFigureOut">
               <a:rPr lang="en-US" smtClean="0"/>
-              <a:t>8/04/15</a:t>
+              <a:t>18/08/15</a:t>
             </a:fld>
             <a:endParaRPr lang="en-US"/>
           </a:p>
@@ -4056,23 +4056,23 @@
           </a:fontRef>
         </p:style>
         <p:txBody>
-          <a:bodyPr rtlCol="0" anchor="ctr"/>
+          <a:bodyPr lIns="36000" rIns="36000" rtlCol="0" anchor="ctr"/>
           <a:lstStyle/>
           <a:p>
             <a:pPr algn="ctr"/>
             <a:r>
-              <a:rPr lang="en-US" sz="1400" dirty="0" err="1" smtClean="0"/>
-              <a:t>Obs</a:t>
-            </a:r>
-            <a:r>
               <a:rPr lang="en-US" sz="1400" dirty="0" smtClean="0"/>
-              <a:t> </a:t>
+              <a:t>Obs </a:t>
             </a:r>
             <a:r>
               <a:rPr lang="en-US" sz="1400" i="1" dirty="0" smtClean="0"/>
               <a:t>N</a:t>
             </a:r>
-            <a:endParaRPr lang="en-US" sz="1400" i="1" dirty="0"/>
+            <a:r>
+              <a:rPr lang="en-US" sz="1400" i="1" baseline="-25000" dirty="0" smtClean="0"/>
+              <a:t>day</a:t>
+            </a:r>
+            <a:endParaRPr lang="en-US" sz="1400" i="1" baseline="-25000" dirty="0"/>
           </a:p>
         </p:txBody>
       </p:sp>
@@ -4365,53 +4365,13 @@
       </p:sp>
       <p:sp>
         <p:nvSpPr>
-          <p:cNvPr id="19" name="Left Brace 18"/>
-          <p:cNvSpPr/>
-          <p:nvPr/>
-        </p:nvSpPr>
-        <p:spPr>
-          <a:xfrm rot="10800000">
-            <a:off x="4461196" y="1058079"/>
-            <a:ext cx="228149" cy="996877"/>
-          </a:xfrm>
-          <a:prstGeom prst="leftBrace">
-            <a:avLst/>
-          </a:prstGeom>
-          <a:ln w="12700" cmpd="sng"/>
-          <a:effectLst/>
-        </p:spPr>
-        <p:style>
-          <a:lnRef idx="2">
-            <a:schemeClr val="accent1"/>
-          </a:lnRef>
-          <a:fillRef idx="0">
-            <a:schemeClr val="accent1"/>
-          </a:fillRef>
-          <a:effectRef idx="1">
-            <a:schemeClr val="accent1"/>
-          </a:effectRef>
-          <a:fontRef idx="minor">
-            <a:schemeClr val="tx1"/>
-          </a:fontRef>
-        </p:style>
-        <p:txBody>
-          <a:bodyPr rtlCol="0" anchor="ctr"/>
-          <a:lstStyle/>
-          <a:p>
-            <a:pPr algn="ctr"/>
-            <a:endParaRPr lang="en-US"/>
-          </a:p>
-        </p:txBody>
-      </p:sp>
-      <p:sp>
-        <p:nvSpPr>
           <p:cNvPr id="20" name="TextBox 19"/>
           <p:cNvSpPr txBox="1"/>
           <p:nvPr/>
         </p:nvSpPr>
         <p:spPr>
           <a:xfrm>
-            <a:off x="4486577" y="1126529"/>
+            <a:off x="2574875" y="1298266"/>
             <a:ext cx="1018409" cy="600164"/>
           </a:xfrm>
           <a:prstGeom prst="rect">
@@ -4427,8 +4387,20 @@
           <a:p>
             <a:pPr algn="ctr"/>
             <a:r>
+              <a:rPr lang="en-US" sz="1100" b="1" i="1" dirty="0" smtClean="0"/>
+              <a:t>S</a:t>
+            </a:r>
+            <a:r>
               <a:rPr lang="en-US" sz="1100" i="1" dirty="0" smtClean="0"/>
-              <a:t>S = 240</a:t>
+              <a:t> = </a:t>
+            </a:r>
+            <a:r>
+              <a:rPr lang="en-US" sz="1100" i="1" dirty="0" smtClean="0"/>
+              <a:t>480 / </a:t>
+            </a:r>
+            <a:r>
+              <a:rPr lang="en-US" sz="1100" b="1" i="1" dirty="0" smtClean="0"/>
+              <a:t>K</a:t>
             </a:r>
             <a:r>
               <a:rPr lang="en-US" sz="1100" dirty="0" smtClean="0"/>
@@ -4446,7 +4418,19 @@
             <a:pPr algn="ctr"/>
             <a:r>
               <a:rPr lang="en-US" sz="1100" dirty="0" smtClean="0"/>
-              <a:t>(2 MHz each)</a:t>
+              <a:t>(</a:t>
+            </a:r>
+            <a:r>
+              <a:rPr lang="en-US" sz="1100" b="1" i="1" dirty="0" smtClean="0"/>
+              <a:t>K</a:t>
+            </a:r>
+            <a:r>
+              <a:rPr lang="en-US" sz="1100" dirty="0" smtClean="0"/>
+              <a:t> </a:t>
+            </a:r>
+            <a:r>
+              <a:rPr lang="en-US" sz="1100" dirty="0" smtClean="0"/>
+              <a:t>MHz each)</a:t>
             </a:r>
             <a:endParaRPr lang="en-US" sz="1100" dirty="0"/>
           </a:p>
@@ -4615,16 +4599,25 @@
             <a:pPr algn="ctr"/>
             <a:r>
               <a:rPr lang="en-US" sz="1200" dirty="0" smtClean="0"/>
-              <a:t>Sub-cube 240</a:t>
-            </a:r>
+              <a:t>Sub-cube </a:t>
+            </a:r>
+            <a:r>
+              <a:rPr lang="en-US" sz="1200" i="1" dirty="0" smtClean="0"/>
+              <a:t>S</a:t>
+            </a:r>
+            <a:endParaRPr lang="en-US" sz="1200" i="1" dirty="0" smtClean="0"/>
           </a:p>
           <a:p>
             <a:pPr algn="ctr"/>
             <a:r>
               <a:rPr lang="en-US" sz="1200" dirty="0" smtClean="0"/>
-              <a:t>Subband 240</a:t>
-            </a:r>
-            <a:endParaRPr lang="en-US" sz="1200" dirty="0"/>
+              <a:t>Subband </a:t>
+            </a:r>
+            <a:r>
+              <a:rPr lang="en-US" sz="1200" i="1" dirty="0" smtClean="0"/>
+              <a:t>S</a:t>
+            </a:r>
+            <a:endParaRPr lang="en-US" sz="1200" i="1" dirty="0"/>
           </a:p>
         </p:txBody>
       </p:sp>
@@ -5138,7 +5131,7 @@
           <a:prstGeom prst="straightConnector1">
             <a:avLst/>
           </a:prstGeom>
-          <a:ln w="12700" cmpd="sng">
+          <a:ln w="19050" cmpd="sng">
             <a:solidFill>
               <a:schemeClr val="accent2">
                 <a:lumMod val="60000"/>
@@ -5180,15 +5173,16 @@
           <a:prstGeom prst="straightConnector1">
             <a:avLst/>
           </a:prstGeom>
-          <a:ln w="12700" cmpd="sng">
+          <a:ln w="19050" cmpd="sng">
             <a:solidFill>
               <a:schemeClr val="tx2">
                 <a:lumMod val="60000"/>
                 <a:lumOff val="40000"/>
               </a:schemeClr>
             </a:solidFill>
-            <a:prstDash val="dash"/>
-            <a:tailEnd type="arrow"/>
+            <a:prstDash val="solid"/>
+            <a:headEnd type="none"/>
+            <a:tailEnd type="triangle"/>
           </a:ln>
         </p:spPr>
         <p:style>
@@ -5222,12 +5216,13 @@
           <a:prstGeom prst="straightConnector1">
             <a:avLst/>
           </a:prstGeom>
-          <a:ln w="12700" cmpd="sng">
+          <a:ln w="38100" cmpd="dbl">
             <a:solidFill>
               <a:srgbClr val="008000"/>
             </a:solidFill>
             <a:prstDash val="dash"/>
-            <a:tailEnd type="arrow"/>
+            <a:headEnd type="none"/>
+            <a:tailEnd type="triangle"/>
           </a:ln>
         </p:spPr>
         <p:style>
@@ -5262,7 +5257,7 @@
           <a:prstGeom prst="straightConnector1">
             <a:avLst/>
           </a:prstGeom>
-          <a:ln w="12700" cmpd="sng">
+          <a:ln w="19050" cmpd="sng">
             <a:solidFill>
               <a:schemeClr val="accent2">
                 <a:lumMod val="60000"/>
@@ -5305,12 +5300,13 @@
           <a:prstGeom prst="straightConnector1">
             <a:avLst/>
           </a:prstGeom>
-          <a:ln w="12700" cmpd="sng">
+          <a:ln w="19050" cmpd="sng">
             <a:solidFill>
               <a:srgbClr val="558ED5"/>
             </a:solidFill>
-            <a:prstDash val="dash"/>
-            <a:tailEnd type="arrow"/>
+            <a:prstDash val="solid"/>
+            <a:headEnd type="none"/>
+            <a:tailEnd type="triangle"/>
           </a:ln>
         </p:spPr>
         <p:style>
@@ -5345,12 +5341,13 @@
           <a:prstGeom prst="straightConnector1">
             <a:avLst/>
           </a:prstGeom>
-          <a:ln w="12700" cmpd="sng">
+          <a:ln w="38100" cmpd="dbl">
             <a:solidFill>
               <a:srgbClr val="008000"/>
             </a:solidFill>
             <a:prstDash val="dash"/>
-            <a:tailEnd type="arrow"/>
+            <a:headEnd type="none"/>
+            <a:tailEnd type="triangle"/>
           </a:ln>
         </p:spPr>
         <p:style>
@@ -5384,7 +5381,7 @@
           <a:prstGeom prst="straightConnector1">
             <a:avLst/>
           </a:prstGeom>
-          <a:ln w="12700" cmpd="sng">
+          <a:ln w="19050" cmpd="sng">
             <a:solidFill>
               <a:schemeClr val="accent2">
                 <a:lumMod val="60000"/>
@@ -5426,12 +5423,13 @@
           <a:prstGeom prst="straightConnector1">
             <a:avLst/>
           </a:prstGeom>
-          <a:ln w="12700" cmpd="sng">
+          <a:ln w="19050" cmpd="sng">
             <a:solidFill>
               <a:srgbClr val="558ED5"/>
             </a:solidFill>
-            <a:prstDash val="dash"/>
-            <a:tailEnd type="arrow"/>
+            <a:prstDash val="solid"/>
+            <a:headEnd type="none"/>
+            <a:tailEnd type="triangle"/>
           </a:ln>
         </p:spPr>
         <p:style>
@@ -5465,12 +5463,13 @@
           <a:prstGeom prst="straightConnector1">
             <a:avLst/>
           </a:prstGeom>
-          <a:ln w="12700" cmpd="sng">
+          <a:ln w="38100" cmpd="dbl">
             <a:solidFill>
               <a:srgbClr val="008000"/>
             </a:solidFill>
             <a:prstDash val="dash"/>
-            <a:tailEnd type="arrow"/>
+            <a:headEnd type="none"/>
+            <a:tailEnd type="triangle"/>
           </a:ln>
         </p:spPr>
         <p:style>
@@ -5516,7 +5515,35 @@
                 <a:latin typeface="Apple Casual"/>
                 <a:cs typeface="Apple Casual"/>
               </a:rPr>
-              <a:t>CLEAN (N splits)</a:t>
+              <a:t>CLEAN </a:t>
+            </a:r>
+            <a:r>
+              <a:rPr lang="en-US" sz="1100" dirty="0" smtClean="0">
+                <a:latin typeface="Apple Casual"/>
+                <a:cs typeface="Apple Casual"/>
+              </a:rPr>
+              <a:t>(</a:t>
+            </a:r>
+            <a:r>
+              <a:rPr lang="en-US" sz="1100" i="1" dirty="0" smtClean="0">
+                <a:latin typeface="Apple Casual"/>
+                <a:cs typeface="Apple Casual"/>
+              </a:rPr>
+              <a:t>N</a:t>
+            </a:r>
+            <a:r>
+              <a:rPr lang="en-US" sz="1100" dirty="0" smtClean="0">
+                <a:latin typeface="Apple Casual"/>
+                <a:cs typeface="Apple Casual"/>
+              </a:rPr>
+              <a:t> </a:t>
+            </a:r>
+            <a:r>
+              <a:rPr lang="en-US" sz="1100" dirty="0" smtClean="0">
+                <a:latin typeface="Apple Casual"/>
+                <a:cs typeface="Apple Casual"/>
+              </a:rPr>
+              <a:t>splits)</a:t>
             </a:r>
             <a:endParaRPr lang="en-US" sz="1100" dirty="0">
               <a:latin typeface="Apple Casual"/>
@@ -5534,7 +5561,7 @@
         <p:spPr>
           <a:xfrm>
             <a:off x="328338" y="555119"/>
-            <a:ext cx="1762123" cy="769441"/>
+            <a:ext cx="2010712" cy="769441"/>
           </a:xfrm>
           <a:prstGeom prst="rect">
             <a:avLst/>
@@ -5554,7 +5581,19 @@
             </a:r>
             <a:r>
               <a:rPr lang="en-US" sz="1100" i="1" dirty="0" smtClean="0"/>
-              <a:t>M (1K ~ 3K)</a:t>
+              <a:t>M </a:t>
+            </a:r>
+            <a:r>
+              <a:rPr lang="en-US" sz="1100" i="1" dirty="0" smtClean="0"/>
+              <a:t>(</a:t>
+            </a:r>
+            <a:r>
+              <a:rPr lang="en-US" sz="1100" i="1" dirty="0" smtClean="0"/>
+              <a:t>4K ~ 6K</a:t>
+            </a:r>
+            <a:r>
+              <a:rPr lang="en-US" sz="1100" i="1" dirty="0" smtClean="0"/>
+              <a:t>)</a:t>
             </a:r>
             <a:r>
               <a:rPr lang="en-US" sz="1100" dirty="0" smtClean="0"/>
@@ -5633,59 +5672,21 @@
             <a:pPr algn="ctr"/>
             <a:r>
               <a:rPr lang="en-US" sz="1050" dirty="0" smtClean="0"/>
-              <a:t>[channel: 128]</a:t>
+              <a:t>[channel: </a:t>
+            </a:r>
+            <a:r>
+              <a:rPr lang="en-US" sz="1050" dirty="0" smtClean="0"/>
+              <a:t>30720 / </a:t>
+            </a:r>
+            <a:r>
+              <a:rPr lang="en-US" sz="1050" b="1" i="1" dirty="0" smtClean="0"/>
+              <a:t>S</a:t>
+            </a:r>
+            <a:r>
+              <a:rPr lang="en-US" sz="1050" dirty="0" smtClean="0"/>
+              <a:t>]</a:t>
             </a:r>
             <a:endParaRPr lang="en-US" sz="1050" dirty="0"/>
-          </a:p>
-        </p:txBody>
-      </p:sp>
-      <p:sp>
-        <p:nvSpPr>
-          <p:cNvPr id="90" name="Cube 89"/>
-          <p:cNvSpPr/>
-          <p:nvPr/>
-        </p:nvSpPr>
-        <p:spPr>
-          <a:xfrm>
-            <a:off x="7911580" y="2675208"/>
-            <a:ext cx="806125" cy="758481"/>
-          </a:xfrm>
-          <a:prstGeom prst="cube">
-            <a:avLst/>
-          </a:prstGeom>
-        </p:spPr>
-        <p:style>
-          <a:lnRef idx="1">
-            <a:schemeClr val="accent2"/>
-          </a:lnRef>
-          <a:fillRef idx="3">
-            <a:schemeClr val="accent2"/>
-          </a:fillRef>
-          <a:effectRef idx="2">
-            <a:schemeClr val="accent2"/>
-          </a:effectRef>
-          <a:fontRef idx="minor">
-            <a:schemeClr val="lt1"/>
-          </a:fontRef>
-        </p:style>
-        <p:txBody>
-          <a:bodyPr rtlCol="0" anchor="ctr"/>
-          <a:lstStyle/>
-          <a:p>
-            <a:pPr algn="ctr"/>
-            <a:r>
-              <a:rPr lang="en-US" sz="1400" dirty="0" smtClean="0">
-                <a:solidFill>
-                  <a:schemeClr val="tx1"/>
-                </a:solidFill>
-              </a:rPr>
-              <a:t>Cube</a:t>
-            </a:r>
-            <a:endParaRPr lang="en-US" sz="1400" dirty="0">
-              <a:solidFill>
-                <a:schemeClr val="tx1"/>
-              </a:solidFill>
-            </a:endParaRPr>
           </a:p>
         </p:txBody>
       </p:sp>
@@ -5740,8 +5741,52 @@
         </p:nvSpPr>
         <p:spPr>
           <a:xfrm>
-            <a:off x="7774690" y="2333209"/>
-            <a:ext cx="1201583" cy="261610"/>
+            <a:off x="7755253" y="2186590"/>
+            <a:ext cx="1201583" cy="415498"/>
+          </a:xfrm>
+          <a:prstGeom prst="rect">
+            <a:avLst/>
+          </a:prstGeom>
+          <a:noFill/>
+        </p:spPr>
+        <p:txBody>
+          <a:bodyPr wrap="square" rtlCol="0">
+            <a:spAutoFit/>
+          </a:bodyPr>
+          <a:lstStyle/>
+          <a:p>
+            <a:pPr algn="ctr"/>
+            <a:r>
+              <a:rPr lang="en-US" sz="1050" dirty="0" smtClean="0">
+                <a:latin typeface="Apple Casual"/>
+                <a:cs typeface="Apple Casual"/>
+              </a:rPr>
+              <a:t>Image </a:t>
+            </a:r>
+            <a:r>
+              <a:rPr lang="en-US" sz="1050" dirty="0" smtClean="0">
+                <a:latin typeface="Apple Casual"/>
+                <a:cs typeface="Apple Casual"/>
+              </a:rPr>
+              <a:t>Concatenation</a:t>
+            </a:r>
+            <a:endParaRPr lang="en-US" sz="1050" dirty="0">
+              <a:latin typeface="Apple Casual"/>
+              <a:cs typeface="Apple Casual"/>
+            </a:endParaRPr>
+          </a:p>
+        </p:txBody>
+      </p:sp>
+      <p:sp>
+        <p:nvSpPr>
+          <p:cNvPr id="93" name="TextBox 92"/>
+          <p:cNvSpPr txBox="1"/>
+          <p:nvPr/>
+        </p:nvSpPr>
+        <p:spPr>
+          <a:xfrm>
+            <a:off x="5860511" y="2397308"/>
+            <a:ext cx="1885727" cy="261610"/>
           </a:xfrm>
           <a:prstGeom prst="rect">
             <a:avLst/>
@@ -5760,7 +5805,21 @@
                 <a:latin typeface="Apple Casual"/>
                 <a:cs typeface="Apple Casual"/>
               </a:rPr>
-              <a:t>Image Stacking</a:t>
+              <a:t>CLEAN (</a:t>
+            </a:r>
+            <a:r>
+              <a:rPr lang="en-US" sz="1100" i="1" dirty="0" smtClean="0">
+                <a:latin typeface="Apple Casual"/>
+                <a:cs typeface="Apple Casual"/>
+              </a:rPr>
+              <a:t>N</a:t>
+            </a:r>
+            <a:r>
+              <a:rPr lang="en-US" sz="1100" dirty="0" smtClean="0">
+                <a:latin typeface="Apple Casual"/>
+                <a:cs typeface="Apple Casual"/>
+              </a:rPr>
+              <a:t> splits)</a:t>
             </a:r>
             <a:endParaRPr lang="en-US" sz="1100" dirty="0">
               <a:latin typeface="Apple Casual"/>
@@ -5771,13 +5830,13 @@
       </p:sp>
       <p:sp>
         <p:nvSpPr>
-          <p:cNvPr id="93" name="TextBox 92"/>
+          <p:cNvPr id="94" name="TextBox 93"/>
           <p:cNvSpPr txBox="1"/>
           <p:nvPr/>
         </p:nvSpPr>
         <p:spPr>
           <a:xfrm>
-            <a:off x="5860511" y="2397308"/>
+            <a:off x="5860511" y="4216400"/>
             <a:ext cx="1885727" cy="261610"/>
           </a:xfrm>
           <a:prstGeom prst="rect">
@@ -5797,44 +5856,21 @@
                 <a:latin typeface="Apple Casual"/>
                 <a:cs typeface="Apple Casual"/>
               </a:rPr>
-              <a:t>CLEAN (N splits)</a:t>
-            </a:r>
-            <a:endParaRPr lang="en-US" sz="1100" dirty="0">
-              <a:latin typeface="Apple Casual"/>
-              <a:cs typeface="Apple Casual"/>
-            </a:endParaRPr>
-          </a:p>
-        </p:txBody>
-      </p:sp>
-      <p:sp>
-        <p:nvSpPr>
-          <p:cNvPr id="94" name="TextBox 93"/>
-          <p:cNvSpPr txBox="1"/>
-          <p:nvPr/>
-        </p:nvSpPr>
-        <p:spPr>
-          <a:xfrm>
-            <a:off x="5860511" y="4216400"/>
-            <a:ext cx="1885727" cy="261610"/>
-          </a:xfrm>
-          <a:prstGeom prst="rect">
-            <a:avLst/>
-          </a:prstGeom>
-          <a:noFill/>
-        </p:spPr>
-        <p:txBody>
-          <a:bodyPr wrap="square" rtlCol="0">
-            <a:spAutoFit/>
-          </a:bodyPr>
-          <a:lstStyle/>
-          <a:p>
-            <a:pPr algn="ctr"/>
+              <a:t>CLEAN (</a:t>
+            </a:r>
+            <a:r>
+              <a:rPr lang="en-US" sz="1100" i="1" dirty="0" smtClean="0">
+                <a:latin typeface="Apple Casual"/>
+                <a:cs typeface="Apple Casual"/>
+              </a:rPr>
+              <a:t>N</a:t>
+            </a:r>
             <a:r>
               <a:rPr lang="en-US" sz="1100" dirty="0" smtClean="0">
                 <a:latin typeface="Apple Casual"/>
                 <a:cs typeface="Apple Casual"/>
               </a:rPr>
-              <a:t>CLEAN (N splits)</a:t>
+              <a:t> splits)</a:t>
             </a:r>
             <a:endParaRPr lang="en-US" sz="1100" dirty="0">
               <a:latin typeface="Apple Casual"/>
@@ -5889,7 +5925,7 @@
         </p:nvSpPr>
         <p:spPr>
           <a:xfrm>
-            <a:off x="1558250" y="4989608"/>
+            <a:off x="1494972" y="4982986"/>
             <a:ext cx="1079903" cy="261610"/>
           </a:xfrm>
           <a:prstGeom prst="rect">
@@ -5959,7 +5995,23 @@
             <a:pPr algn="ctr"/>
             <a:r>
               <a:rPr lang="en-US" sz="1050" dirty="0" smtClean="0"/>
-              <a:t>[baseline: 351][channel: 128]</a:t>
+              <a:t>[baseline: 351][channel: </a:t>
+            </a:r>
+            <a:r>
+              <a:rPr lang="en-US" sz="1050" dirty="0"/>
+              <a:t>30720 / </a:t>
+            </a:r>
+            <a:r>
+              <a:rPr lang="en-US" sz="1050" b="1" i="1" dirty="0"/>
+              <a:t>S</a:t>
+            </a:r>
+            <a:r>
+              <a:rPr lang="en-US" sz="1050" dirty="0" smtClean="0"/>
+              <a:t>]</a:t>
+            </a:r>
+            <a:r>
+              <a:rPr lang="en-US" sz="1050" dirty="0" smtClean="0"/>
+              <a:t/>
             </a:r>
             <a:br>
               <a:rPr lang="en-US" sz="1050" dirty="0" smtClean="0"/>
@@ -5976,8 +6028,8 @@
         </p:nvSpPr>
         <p:spPr>
           <a:xfrm>
-            <a:off x="7659981" y="2038048"/>
-            <a:ext cx="1398399" cy="415498"/>
+            <a:off x="7588309" y="3503790"/>
+            <a:ext cx="1398399" cy="577081"/>
           </a:xfrm>
           <a:prstGeom prst="rect">
             <a:avLst/>
@@ -5993,7 +6045,22 @@
             <a:pPr algn="ctr"/>
             <a:r>
               <a:rPr lang="en-US" sz="1050" dirty="0" smtClean="0"/>
-              <a:t>2048 x 2048 x 30720</a:t>
+              <a:t> </a:t>
+            </a:r>
+            <a:r>
+              <a:rPr lang="en-US" sz="1050" b="1" dirty="0" smtClean="0"/>
+              <a:t>CHILES Cube</a:t>
+            </a:r>
+          </a:p>
+          <a:p>
+            <a:pPr algn="ctr"/>
+            <a:r>
+              <a:rPr lang="en-US" sz="1050" dirty="0" smtClean="0"/>
+              <a:t>2048 </a:t>
+            </a:r>
+            <a:r>
+              <a:rPr lang="en-US" sz="1050" dirty="0" smtClean="0"/>
+              <a:t>x 2048 x 30720</a:t>
             </a:r>
           </a:p>
           <a:p>
@@ -6066,6 +6133,58 @@
           </a:p>
         </p:txBody>
       </p:sp>
+      <p:pic>
+        <p:nvPicPr>
+          <p:cNvPr id="3" name="Picture 2"/>
+          <p:cNvPicPr>
+            <a:picLocks noChangeAspect="1"/>
+          </p:cNvPicPr>
+          <p:nvPr/>
+        </p:nvPicPr>
+        <p:blipFill>
+          <a:blip r:embed="rId3">
+            <a:clrChange>
+              <a:clrFrom>
+                <a:srgbClr val="0A0850"/>
+              </a:clrFrom>
+              <a:clrTo>
+                <a:srgbClr val="0A0850">
+                  <a:alpha val="0"/>
+                </a:srgbClr>
+              </a:clrTo>
+            </a:clrChange>
+            <a:extLst>
+              <a:ext uri="{BEBA8EAE-BF5A-486C-A8C5-ECC9F3942E4B}">
+                <a14:imgProps xmlns:a14="http://schemas.microsoft.com/office/drawing/2010/main">
+                  <a14:imgLayer r:embed="rId4">
+                    <a14:imgEffect>
+                      <a14:sharpenSoften amount="-50000"/>
+                    </a14:imgEffect>
+                    <a14:imgEffect>
+                      <a14:saturation sat="200000"/>
+                    </a14:imgEffect>
+                    <a14:imgEffect>
+                      <a14:brightnessContrast bright="40000" contrast="40000"/>
+                    </a14:imgEffect>
+                  </a14:imgLayer>
+                </a14:imgProps>
+              </a:ext>
+            </a:extLst>
+          </a:blip>
+          <a:stretch>
+            <a:fillRect/>
+          </a:stretch>
+        </p:blipFill>
+        <p:spPr>
+          <a:xfrm>
+            <a:off x="7774690" y="2573345"/>
+            <a:ext cx="1160834" cy="964922"/>
+          </a:xfrm>
+          <a:prstGeom prst="rect">
+            <a:avLst/>
+          </a:prstGeom>
+        </p:spPr>
+      </p:pic>
     </p:spTree>
     <p:extLst>
       <p:ext uri="{BB962C8B-B14F-4D97-AF65-F5344CB8AC3E}">
@@ -6076,6 +6195,13 @@
   <p:clrMapOvr>
     <a:masterClrMapping/>
   </p:clrMapOvr>
+  <p:timing>
+    <p:tnLst>
+      <p:par>
+        <p:cTn xmlns:p14="http://schemas.microsoft.com/office/powerpoint/2010/main" id="1" dur="indefinite" restart="never" nodeType="tmRoot"/>
+      </p:par>
+    </p:tnLst>
+  </p:timing>
 </p:sld>
 </file>
 
@@ -10874,7 +11000,6 @@
               <a:rPr lang="en-US" sz="1000" i="1" dirty="0"/>
               <a:t>m</a:t>
             </a:r>
-            <a:endParaRPr lang="en-US" sz="1000" i="1" dirty="0"/>
           </a:p>
         </p:txBody>
       </p:sp>

</xml_diff>